<commit_message>
added team distro to world, fixxed some white spaces, apendix needs to be sorted out tho
</commit_message>
<xml_diff>
--- a/FinalsPresentation.pptx
+++ b/FinalsPresentation.pptx
@@ -12,11 +12,12 @@
     <p:sldId id="280" r:id="rId6"/>
     <p:sldId id="260" r:id="rId7"/>
     <p:sldId id="261" r:id="rId8"/>
-    <p:sldId id="263" r:id="rId9"/>
-    <p:sldId id="269" r:id="rId10"/>
-    <p:sldId id="264" r:id="rId11"/>
-    <p:sldId id="282" r:id="rId12"/>
-    <p:sldId id="270" r:id="rId13"/>
+    <p:sldId id="262" r:id="rId9"/>
+    <p:sldId id="263" r:id="rId10"/>
+    <p:sldId id="269" r:id="rId11"/>
+    <p:sldId id="264" r:id="rId12"/>
+    <p:sldId id="282" r:id="rId13"/>
+    <p:sldId id="270" r:id="rId14"/>
   </p:sldIdLst>
   <p:sldSz cx="9144000" cy="6858000" type="screen4x3"/>
   <p:notesSz cx="6858000" cy="9144000"/>
@@ -6468,7 +6469,7 @@
             </a:ln>
             <a:extLst>
               <a:ext uri="{91240B29-F687-4f45-9708-019B960494DF}">
-                <a14:hiddenLine xmlns="" xmlns:a14="http://schemas.microsoft.com/office/drawing/2010/main" w="9525">
+                <a14:hiddenLine xmlns:a14="http://schemas.microsoft.com/office/drawing/2010/main" xmlns="" w="9525">
                   <a:solidFill>
                     <a:srgbClr val="000000"/>
                   </a:solidFill>
@@ -7549,7 +7550,7 @@
             </a:ln>
             <a:extLst>
               <a:ext uri="{91240B29-F687-4f45-9708-019B960494DF}">
-                <a14:hiddenLine xmlns="" xmlns:a14="http://schemas.microsoft.com/office/drawing/2010/main" w="9525">
+                <a14:hiddenLine xmlns:a14="http://schemas.microsoft.com/office/drawing/2010/main" xmlns="" w="9525">
                   <a:solidFill>
                     <a:srgbClr val="000000"/>
                   </a:solidFill>
@@ -8635,7 +8636,7 @@
             </a:ln>
             <a:extLst>
               <a:ext uri="{91240B29-F687-4f45-9708-019B960494DF}">
-                <a14:hiddenLine xmlns="" xmlns:a14="http://schemas.microsoft.com/office/drawing/2010/main" w="9525">
+                <a14:hiddenLine xmlns:a14="http://schemas.microsoft.com/office/drawing/2010/main" xmlns="" w="9525">
                   <a:solidFill>
                     <a:srgbClr val="000000"/>
                   </a:solidFill>
@@ -9596,7 +9597,7 @@
             </a:ln>
             <a:extLst>
               <a:ext uri="{91240B29-F687-4f45-9708-019B960494DF}">
-                <a14:hiddenLine xmlns="" xmlns:a14="http://schemas.microsoft.com/office/drawing/2010/main" w="9525">
+                <a14:hiddenLine xmlns:a14="http://schemas.microsoft.com/office/drawing/2010/main" xmlns="" w="9525">
                   <a:solidFill>
                     <a:srgbClr val="000000"/>
                   </a:solidFill>
@@ -10711,7 +10712,7 @@
             </a:ln>
             <a:extLst>
               <a:ext uri="{91240B29-F687-4f45-9708-019B960494DF}">
-                <a14:hiddenLine xmlns="" xmlns:a14="http://schemas.microsoft.com/office/drawing/2010/main" w="9525">
+                <a14:hiddenLine xmlns:a14="http://schemas.microsoft.com/office/drawing/2010/main" xmlns="" w="9525">
                   <a:solidFill>
                     <a:srgbClr val="000000"/>
                   </a:solidFill>
@@ -13460,7 +13461,7 @@
           </a:ln>
           <a:extLst>
             <a:ext uri="{91240B29-F687-4f45-9708-019B960494DF}">
-              <a14:hiddenLine xmlns="" xmlns:a14="http://schemas.microsoft.com/office/drawing/2010/main" w="9525">
+              <a14:hiddenLine xmlns:a14="http://schemas.microsoft.com/office/drawing/2010/main" xmlns="" w="9525">
                 <a:solidFill>
                   <a:srgbClr val="000000"/>
                 </a:solidFill>
@@ -14635,7 +14636,7 @@
             </a:ln>
             <a:extLst>
               <a:ext uri="{91240B29-F687-4f45-9708-019B960494DF}">
-                <a14:hiddenLine xmlns="" xmlns:a14="http://schemas.microsoft.com/office/drawing/2010/main" w="9525">
+                <a14:hiddenLine xmlns:a14="http://schemas.microsoft.com/office/drawing/2010/main" xmlns="" w="9525">
                   <a:solidFill>
                     <a:srgbClr val="000000"/>
                   </a:solidFill>
@@ -16603,7 +16604,7 @@
             </a:ln>
             <a:extLst>
               <a:ext uri="{91240B29-F687-4f45-9708-019B960494DF}">
-                <a14:hiddenLine xmlns="" xmlns:a14="http://schemas.microsoft.com/office/drawing/2010/main" w="9525">
+                <a14:hiddenLine xmlns:a14="http://schemas.microsoft.com/office/drawing/2010/main" xmlns="" w="9525">
                   <a:solidFill>
                     <a:srgbClr val="000000"/>
                   </a:solidFill>
@@ -17661,7 +17662,7 @@
             </a:ln>
             <a:extLst>
               <a:ext uri="{91240B29-F687-4f45-9708-019B960494DF}">
-                <a14:hiddenLine xmlns="" xmlns:a14="http://schemas.microsoft.com/office/drawing/2010/main" w="9525">
+                <a14:hiddenLine xmlns:a14="http://schemas.microsoft.com/office/drawing/2010/main" xmlns="" w="9525">
                   <a:solidFill>
                     <a:srgbClr val="000000"/>
                   </a:solidFill>
@@ -18711,7 +18712,7 @@
             </a:ln>
             <a:extLst>
               <a:ext uri="{91240B29-F687-4f45-9708-019B960494DF}">
-                <a14:hiddenLine xmlns="" xmlns:a14="http://schemas.microsoft.com/office/drawing/2010/main" w="9525">
+                <a14:hiddenLine xmlns:a14="http://schemas.microsoft.com/office/drawing/2010/main" xmlns="" w="9525">
                   <a:solidFill>
                     <a:srgbClr val="000000"/>
                   </a:solidFill>
@@ -19835,6 +19836,682 @@
   <p:cSld>
     <p:spTree>
       <p:nvGrpSpPr>
+        <p:cNvPr id="1" name="">
+          <a:extLst>
+            <a:ext uri="{FF2B5EF4-FFF2-40B4-BE49-F238E27FC236}">
+              <a16:creationId xmlns:a16="http://schemas.microsoft.com/office/drawing/2014/main" id="{EFDD33E0-45E1-C3D3-0DA7-F1349EEB6903}"/>
+            </a:ext>
+          </a:extLst>
+        </p:cNvPr>
+        <p:cNvGrpSpPr/>
+        <p:nvPr/>
+      </p:nvGrpSpPr>
+      <p:grpSpPr>
+        <a:xfrm>
+          <a:off x="0" y="0"/>
+          <a:ext cx="0" cy="0"/>
+          <a:chOff x="0" y="0"/>
+          <a:chExt cx="0" cy="0"/>
+        </a:xfrm>
+      </p:grpSpPr>
+      <p:sp>
+        <p:nvSpPr>
+          <p:cNvPr id="2" name="Titel 1">
+            <a:extLst>
+              <a:ext uri="{FF2B5EF4-FFF2-40B4-BE49-F238E27FC236}">
+                <a16:creationId xmlns:a16="http://schemas.microsoft.com/office/drawing/2014/main" id="{AD237D43-D834-5F9E-0EAB-E0D76B636679}"/>
+              </a:ext>
+            </a:extLst>
+          </p:cNvPr>
+          <p:cNvSpPr>
+            <a:spLocks noGrp="1"/>
+          </p:cNvSpPr>
+          <p:nvPr>
+            <p:ph type="title"/>
+          </p:nvPr>
+        </p:nvSpPr>
+        <p:spPr/>
+        <p:txBody>
+          <a:bodyPr/>
+          <a:lstStyle/>
+          <a:p>
+            <a:r>
+              <a:rPr lang="de-DE" dirty="0"/>
+              <a:t>Teamwork &amp; Task Distribution</a:t>
+            </a:r>
+          </a:p>
+        </p:txBody>
+      </p:sp>
+      <p:sp>
+        <p:nvSpPr>
+          <p:cNvPr id="3" name="Inhaltsplatzhalter 2">
+            <a:extLst>
+              <a:ext uri="{FF2B5EF4-FFF2-40B4-BE49-F238E27FC236}">
+                <a16:creationId xmlns:a16="http://schemas.microsoft.com/office/drawing/2014/main" id="{9E430164-D344-9636-DEE0-9D0050066D86}"/>
+              </a:ext>
+            </a:extLst>
+          </p:cNvPr>
+          <p:cNvSpPr>
+            <a:spLocks noGrp="1"/>
+          </p:cNvSpPr>
+          <p:nvPr>
+            <p:ph idx="1"/>
+          </p:nvPr>
+        </p:nvSpPr>
+        <p:spPr/>
+        <p:txBody>
+          <a:bodyPr>
+            <a:normAutofit fontScale="92500" lnSpcReduction="10000"/>
+          </a:bodyPr>
+          <a:lstStyle/>
+          <a:p>
+            <a:r>
+              <a:rPr lang="en-US" dirty="0"/>
+              <a:t>Tasks chosen based on personal interests</a:t>
+            </a:r>
+          </a:p>
+          <a:p>
+            <a:r>
+              <a:rPr lang="en-US" dirty="0"/>
+              <a:t>Workload balanced across the team</a:t>
+            </a:r>
+          </a:p>
+          <a:p>
+            <a:r>
+              <a:rPr lang="de-DE" dirty="0" err="1"/>
+              <a:t>Everyone</a:t>
+            </a:r>
+            <a:r>
+              <a:rPr lang="de-DE" dirty="0"/>
+              <a:t> </a:t>
+            </a:r>
+            <a:r>
+              <a:rPr lang="de-DE" dirty="0" err="1"/>
+              <a:t>contributed</a:t>
+            </a:r>
+            <a:r>
+              <a:rPr lang="de-DE" dirty="0"/>
+              <a:t> </a:t>
+            </a:r>
+            <a:r>
+              <a:rPr lang="de-DE" dirty="0" err="1"/>
+              <a:t>equally</a:t>
+            </a:r>
+            <a:endParaRPr lang="en-US" dirty="0"/>
+          </a:p>
+          <a:p>
+            <a:r>
+              <a:rPr lang="en-US" dirty="0"/>
+              <a:t>Dilara: Data Retrieval and Initial Code Testing with Python, Information Retrieval, </a:t>
+            </a:r>
+            <a:r>
+              <a:rPr lang="en-US" dirty="0" err="1"/>
+              <a:t>Powerpoint</a:t>
+            </a:r>
+            <a:r>
+              <a:rPr lang="en-US" dirty="0"/>
+              <a:t>, Report</a:t>
+            </a:r>
+          </a:p>
+          <a:p>
+            <a:r>
+              <a:rPr lang="en-US" dirty="0"/>
+              <a:t>Elyesa: Neo4j-Character Analysis, Report, Presentation, Team Mentoring</a:t>
+            </a:r>
+          </a:p>
+          <a:p>
+            <a:r>
+              <a:rPr lang="en-US" dirty="0"/>
+              <a:t>Tim: Character-Analysis-Evaluation, Report, UI</a:t>
+            </a:r>
+          </a:p>
+          <a:p>
+            <a:r>
+              <a:rPr lang="en-US" dirty="0"/>
+              <a:t>Hamidreza: Neo4j-Migration and Neo4j-Shortes-Path, Information Retrieval, Report</a:t>
+            </a:r>
+            <a:br>
+              <a:rPr lang="en-US" dirty="0"/>
+            </a:br>
+            <a:endParaRPr lang="en-US" dirty="0"/>
+          </a:p>
+        </p:txBody>
+      </p:sp>
+    </p:spTree>
+    <p:extLst>
+      <p:ext uri="{BB962C8B-B14F-4D97-AF65-F5344CB8AC3E}">
+        <p14:creationId xmlns:p14="http://schemas.microsoft.com/office/powerpoint/2010/main" val="3070015078"/>
+      </p:ext>
+    </p:extLst>
+  </p:cSld>
+  <p:clrMapOvr>
+    <a:masterClrMapping/>
+  </p:clrMapOvr>
+  <p:timing>
+    <p:tnLst>
+      <p:par>
+        <p:cTn id="1" dur="indefinite" restart="never" nodeType="tmRoot">
+          <p:childTnLst>
+            <p:seq concurrent="1" nextAc="seek">
+              <p:cTn id="2" dur="indefinite" nodeType="mainSeq">
+                <p:childTnLst>
+                  <p:par>
+                    <p:cTn id="3" fill="hold">
+                      <p:stCondLst>
+                        <p:cond delay="indefinite"/>
+                        <p:cond evt="onBegin" delay="0">
+                          <p:tn val="2"/>
+                        </p:cond>
+                      </p:stCondLst>
+                      <p:childTnLst>
+                        <p:par>
+                          <p:cTn id="4" fill="hold">
+                            <p:stCondLst>
+                              <p:cond delay="0"/>
+                            </p:stCondLst>
+                            <p:childTnLst>
+                              <p:par>
+                                <p:cTn id="5" presetID="10" presetClass="entr" presetSubtype="0" fill="hold" grpId="0" nodeType="withEffect">
+                                  <p:stCondLst>
+                                    <p:cond delay="0"/>
+                                  </p:stCondLst>
+                                  <p:childTnLst>
+                                    <p:set>
+                                      <p:cBhvr>
+                                        <p:cTn id="6" dur="1" fill="hold">
+                                          <p:stCondLst>
+                                            <p:cond delay="0"/>
+                                          </p:stCondLst>
+                                        </p:cTn>
+                                        <p:tgtEl>
+                                          <p:spTgt spid="2"/>
+                                        </p:tgtEl>
+                                        <p:attrNameLst>
+                                          <p:attrName>style.visibility</p:attrName>
+                                        </p:attrNameLst>
+                                      </p:cBhvr>
+                                      <p:to>
+                                        <p:strVal val="visible"/>
+                                      </p:to>
+                                    </p:set>
+                                    <p:animEffect transition="in" filter="fade">
+                                      <p:cBhvr>
+                                        <p:cTn id="7" dur="500"/>
+                                        <p:tgtEl>
+                                          <p:spTgt spid="2"/>
+                                        </p:tgtEl>
+                                      </p:cBhvr>
+                                    </p:animEffect>
+                                  </p:childTnLst>
+                                </p:cTn>
+                              </p:par>
+                            </p:childTnLst>
+                          </p:cTn>
+                        </p:par>
+                      </p:childTnLst>
+                    </p:cTn>
+                  </p:par>
+                  <p:par>
+                    <p:cTn id="8" fill="hold">
+                      <p:stCondLst>
+                        <p:cond delay="indefinite"/>
+                      </p:stCondLst>
+                      <p:childTnLst>
+                        <p:par>
+                          <p:cTn id="9" fill="hold">
+                            <p:stCondLst>
+                              <p:cond delay="0"/>
+                            </p:stCondLst>
+                            <p:childTnLst>
+                              <p:par>
+                                <p:cTn id="10" presetID="10" presetClass="entr" presetSubtype="0" fill="hold" grpId="0" nodeType="clickEffect">
+                                  <p:stCondLst>
+                                    <p:cond delay="0"/>
+                                  </p:stCondLst>
+                                  <p:childTnLst>
+                                    <p:set>
+                                      <p:cBhvr>
+                                        <p:cTn id="11" dur="1" fill="hold">
+                                          <p:stCondLst>
+                                            <p:cond delay="0"/>
+                                          </p:stCondLst>
+                                        </p:cTn>
+                                        <p:tgtEl>
+                                          <p:spTgt spid="3">
+                                            <p:txEl>
+                                              <p:pRg st="0" end="0"/>
+                                            </p:txEl>
+                                          </p:spTgt>
+                                        </p:tgtEl>
+                                        <p:attrNameLst>
+                                          <p:attrName>style.visibility</p:attrName>
+                                        </p:attrNameLst>
+                                      </p:cBhvr>
+                                      <p:to>
+                                        <p:strVal val="visible"/>
+                                      </p:to>
+                                    </p:set>
+                                    <p:animEffect transition="in" filter="fade">
+                                      <p:cBhvr>
+                                        <p:cTn id="12" dur="500"/>
+                                        <p:tgtEl>
+                                          <p:spTgt spid="3">
+                                            <p:txEl>
+                                              <p:pRg st="0" end="0"/>
+                                            </p:txEl>
+                                          </p:spTgt>
+                                        </p:tgtEl>
+                                      </p:cBhvr>
+                                    </p:animEffect>
+                                  </p:childTnLst>
+                                </p:cTn>
+                              </p:par>
+                            </p:childTnLst>
+                          </p:cTn>
+                        </p:par>
+                      </p:childTnLst>
+                    </p:cTn>
+                  </p:par>
+                  <p:par>
+                    <p:cTn id="13" fill="hold">
+                      <p:stCondLst>
+                        <p:cond delay="indefinite"/>
+                      </p:stCondLst>
+                      <p:childTnLst>
+                        <p:par>
+                          <p:cTn id="14" fill="hold">
+                            <p:stCondLst>
+                              <p:cond delay="0"/>
+                            </p:stCondLst>
+                            <p:childTnLst>
+                              <p:par>
+                                <p:cTn id="15" presetID="10" presetClass="entr" presetSubtype="0" fill="hold" grpId="0" nodeType="clickEffect">
+                                  <p:stCondLst>
+                                    <p:cond delay="0"/>
+                                  </p:stCondLst>
+                                  <p:childTnLst>
+                                    <p:set>
+                                      <p:cBhvr>
+                                        <p:cTn id="16" dur="1" fill="hold">
+                                          <p:stCondLst>
+                                            <p:cond delay="0"/>
+                                          </p:stCondLst>
+                                        </p:cTn>
+                                        <p:tgtEl>
+                                          <p:spTgt spid="3">
+                                            <p:txEl>
+                                              <p:pRg st="1" end="1"/>
+                                            </p:txEl>
+                                          </p:spTgt>
+                                        </p:tgtEl>
+                                        <p:attrNameLst>
+                                          <p:attrName>style.visibility</p:attrName>
+                                        </p:attrNameLst>
+                                      </p:cBhvr>
+                                      <p:to>
+                                        <p:strVal val="visible"/>
+                                      </p:to>
+                                    </p:set>
+                                    <p:animEffect transition="in" filter="fade">
+                                      <p:cBhvr>
+                                        <p:cTn id="17" dur="500"/>
+                                        <p:tgtEl>
+                                          <p:spTgt spid="3">
+                                            <p:txEl>
+                                              <p:pRg st="1" end="1"/>
+                                            </p:txEl>
+                                          </p:spTgt>
+                                        </p:tgtEl>
+                                      </p:cBhvr>
+                                    </p:animEffect>
+                                  </p:childTnLst>
+                                </p:cTn>
+                              </p:par>
+                            </p:childTnLst>
+                          </p:cTn>
+                        </p:par>
+                      </p:childTnLst>
+                    </p:cTn>
+                  </p:par>
+                  <p:par>
+                    <p:cTn id="18" fill="hold">
+                      <p:stCondLst>
+                        <p:cond delay="indefinite"/>
+                      </p:stCondLst>
+                      <p:childTnLst>
+                        <p:par>
+                          <p:cTn id="19" fill="hold">
+                            <p:stCondLst>
+                              <p:cond delay="0"/>
+                            </p:stCondLst>
+                            <p:childTnLst>
+                              <p:par>
+                                <p:cTn id="20" presetID="10" presetClass="entr" presetSubtype="0" fill="hold" grpId="0" nodeType="clickEffect">
+                                  <p:stCondLst>
+                                    <p:cond delay="0"/>
+                                  </p:stCondLst>
+                                  <p:childTnLst>
+                                    <p:set>
+                                      <p:cBhvr>
+                                        <p:cTn id="21" dur="1" fill="hold">
+                                          <p:stCondLst>
+                                            <p:cond delay="0"/>
+                                          </p:stCondLst>
+                                        </p:cTn>
+                                        <p:tgtEl>
+                                          <p:spTgt spid="3">
+                                            <p:txEl>
+                                              <p:pRg st="2" end="2"/>
+                                            </p:txEl>
+                                          </p:spTgt>
+                                        </p:tgtEl>
+                                        <p:attrNameLst>
+                                          <p:attrName>style.visibility</p:attrName>
+                                        </p:attrNameLst>
+                                      </p:cBhvr>
+                                      <p:to>
+                                        <p:strVal val="visible"/>
+                                      </p:to>
+                                    </p:set>
+                                    <p:animEffect transition="in" filter="fade">
+                                      <p:cBhvr>
+                                        <p:cTn id="22" dur="500"/>
+                                        <p:tgtEl>
+                                          <p:spTgt spid="3">
+                                            <p:txEl>
+                                              <p:pRg st="2" end="2"/>
+                                            </p:txEl>
+                                          </p:spTgt>
+                                        </p:tgtEl>
+                                      </p:cBhvr>
+                                    </p:animEffect>
+                                  </p:childTnLst>
+                                </p:cTn>
+                              </p:par>
+                            </p:childTnLst>
+                          </p:cTn>
+                        </p:par>
+                      </p:childTnLst>
+                    </p:cTn>
+                  </p:par>
+                  <p:par>
+                    <p:cTn id="23" fill="hold">
+                      <p:stCondLst>
+                        <p:cond delay="indefinite"/>
+                      </p:stCondLst>
+                      <p:childTnLst>
+                        <p:par>
+                          <p:cTn id="24" fill="hold">
+                            <p:stCondLst>
+                              <p:cond delay="0"/>
+                            </p:stCondLst>
+                            <p:childTnLst>
+                              <p:par>
+                                <p:cTn id="25" presetID="10" presetClass="entr" presetSubtype="0" fill="hold" grpId="0" nodeType="clickEffect">
+                                  <p:stCondLst>
+                                    <p:cond delay="0"/>
+                                  </p:stCondLst>
+                                  <p:childTnLst>
+                                    <p:set>
+                                      <p:cBhvr>
+                                        <p:cTn id="26" dur="1" fill="hold">
+                                          <p:stCondLst>
+                                            <p:cond delay="0"/>
+                                          </p:stCondLst>
+                                        </p:cTn>
+                                        <p:tgtEl>
+                                          <p:spTgt spid="3">
+                                            <p:txEl>
+                                              <p:pRg st="3" end="3"/>
+                                            </p:txEl>
+                                          </p:spTgt>
+                                        </p:tgtEl>
+                                        <p:attrNameLst>
+                                          <p:attrName>style.visibility</p:attrName>
+                                        </p:attrNameLst>
+                                      </p:cBhvr>
+                                      <p:to>
+                                        <p:strVal val="visible"/>
+                                      </p:to>
+                                    </p:set>
+                                    <p:animEffect transition="in" filter="fade">
+                                      <p:cBhvr>
+                                        <p:cTn id="27" dur="500"/>
+                                        <p:tgtEl>
+                                          <p:spTgt spid="3">
+                                            <p:txEl>
+                                              <p:pRg st="3" end="3"/>
+                                            </p:txEl>
+                                          </p:spTgt>
+                                        </p:tgtEl>
+                                      </p:cBhvr>
+                                    </p:animEffect>
+                                  </p:childTnLst>
+                                </p:cTn>
+                              </p:par>
+                            </p:childTnLst>
+                          </p:cTn>
+                        </p:par>
+                      </p:childTnLst>
+                    </p:cTn>
+                  </p:par>
+                  <p:par>
+                    <p:cTn id="28" fill="hold">
+                      <p:stCondLst>
+                        <p:cond delay="indefinite"/>
+                      </p:stCondLst>
+                      <p:childTnLst>
+                        <p:par>
+                          <p:cTn id="29" fill="hold">
+                            <p:stCondLst>
+                              <p:cond delay="0"/>
+                            </p:stCondLst>
+                            <p:childTnLst>
+                              <p:par>
+                                <p:cTn id="30" presetID="10" presetClass="entr" presetSubtype="0" fill="hold" grpId="0" nodeType="clickEffect">
+                                  <p:stCondLst>
+                                    <p:cond delay="0"/>
+                                  </p:stCondLst>
+                                  <p:childTnLst>
+                                    <p:set>
+                                      <p:cBhvr>
+                                        <p:cTn id="31" dur="1" fill="hold">
+                                          <p:stCondLst>
+                                            <p:cond delay="0"/>
+                                          </p:stCondLst>
+                                        </p:cTn>
+                                        <p:tgtEl>
+                                          <p:spTgt spid="3">
+                                            <p:txEl>
+                                              <p:pRg st="4" end="4"/>
+                                            </p:txEl>
+                                          </p:spTgt>
+                                        </p:tgtEl>
+                                        <p:attrNameLst>
+                                          <p:attrName>style.visibility</p:attrName>
+                                        </p:attrNameLst>
+                                      </p:cBhvr>
+                                      <p:to>
+                                        <p:strVal val="visible"/>
+                                      </p:to>
+                                    </p:set>
+                                    <p:animEffect transition="in" filter="fade">
+                                      <p:cBhvr>
+                                        <p:cTn id="32" dur="500"/>
+                                        <p:tgtEl>
+                                          <p:spTgt spid="3">
+                                            <p:txEl>
+                                              <p:pRg st="4" end="4"/>
+                                            </p:txEl>
+                                          </p:spTgt>
+                                        </p:tgtEl>
+                                      </p:cBhvr>
+                                    </p:animEffect>
+                                  </p:childTnLst>
+                                </p:cTn>
+                              </p:par>
+                            </p:childTnLst>
+                          </p:cTn>
+                        </p:par>
+                      </p:childTnLst>
+                    </p:cTn>
+                  </p:par>
+                  <p:par>
+                    <p:cTn id="33" fill="hold">
+                      <p:stCondLst>
+                        <p:cond delay="indefinite"/>
+                      </p:stCondLst>
+                      <p:childTnLst>
+                        <p:par>
+                          <p:cTn id="34" fill="hold">
+                            <p:stCondLst>
+                              <p:cond delay="0"/>
+                            </p:stCondLst>
+                            <p:childTnLst>
+                              <p:par>
+                                <p:cTn id="35" presetID="10" presetClass="entr" presetSubtype="0" fill="hold" grpId="0" nodeType="clickEffect">
+                                  <p:stCondLst>
+                                    <p:cond delay="0"/>
+                                  </p:stCondLst>
+                                  <p:childTnLst>
+                                    <p:set>
+                                      <p:cBhvr>
+                                        <p:cTn id="36" dur="1" fill="hold">
+                                          <p:stCondLst>
+                                            <p:cond delay="0"/>
+                                          </p:stCondLst>
+                                        </p:cTn>
+                                        <p:tgtEl>
+                                          <p:spTgt spid="3">
+                                            <p:txEl>
+                                              <p:pRg st="5" end="5"/>
+                                            </p:txEl>
+                                          </p:spTgt>
+                                        </p:tgtEl>
+                                        <p:attrNameLst>
+                                          <p:attrName>style.visibility</p:attrName>
+                                        </p:attrNameLst>
+                                      </p:cBhvr>
+                                      <p:to>
+                                        <p:strVal val="visible"/>
+                                      </p:to>
+                                    </p:set>
+                                    <p:animEffect transition="in" filter="fade">
+                                      <p:cBhvr>
+                                        <p:cTn id="37" dur="500"/>
+                                        <p:tgtEl>
+                                          <p:spTgt spid="3">
+                                            <p:txEl>
+                                              <p:pRg st="5" end="5"/>
+                                            </p:txEl>
+                                          </p:spTgt>
+                                        </p:tgtEl>
+                                      </p:cBhvr>
+                                    </p:animEffect>
+                                  </p:childTnLst>
+                                </p:cTn>
+                              </p:par>
+                            </p:childTnLst>
+                          </p:cTn>
+                        </p:par>
+                      </p:childTnLst>
+                    </p:cTn>
+                  </p:par>
+                  <p:par>
+                    <p:cTn id="38" fill="hold">
+                      <p:stCondLst>
+                        <p:cond delay="indefinite"/>
+                      </p:stCondLst>
+                      <p:childTnLst>
+                        <p:par>
+                          <p:cTn id="39" fill="hold">
+                            <p:stCondLst>
+                              <p:cond delay="0"/>
+                            </p:stCondLst>
+                            <p:childTnLst>
+                              <p:par>
+                                <p:cTn id="40" presetID="10" presetClass="entr" presetSubtype="0" fill="hold" grpId="0" nodeType="clickEffect">
+                                  <p:stCondLst>
+                                    <p:cond delay="0"/>
+                                  </p:stCondLst>
+                                  <p:childTnLst>
+                                    <p:set>
+                                      <p:cBhvr>
+                                        <p:cTn id="41" dur="1" fill="hold">
+                                          <p:stCondLst>
+                                            <p:cond delay="0"/>
+                                          </p:stCondLst>
+                                        </p:cTn>
+                                        <p:tgtEl>
+                                          <p:spTgt spid="3">
+                                            <p:txEl>
+                                              <p:pRg st="6" end="6"/>
+                                            </p:txEl>
+                                          </p:spTgt>
+                                        </p:tgtEl>
+                                        <p:attrNameLst>
+                                          <p:attrName>style.visibility</p:attrName>
+                                        </p:attrNameLst>
+                                      </p:cBhvr>
+                                      <p:to>
+                                        <p:strVal val="visible"/>
+                                      </p:to>
+                                    </p:set>
+                                    <p:animEffect transition="in" filter="fade">
+                                      <p:cBhvr>
+                                        <p:cTn id="42" dur="500"/>
+                                        <p:tgtEl>
+                                          <p:spTgt spid="3">
+                                            <p:txEl>
+                                              <p:pRg st="6" end="6"/>
+                                            </p:txEl>
+                                          </p:spTgt>
+                                        </p:tgtEl>
+                                      </p:cBhvr>
+                                    </p:animEffect>
+                                  </p:childTnLst>
+                                </p:cTn>
+                              </p:par>
+                            </p:childTnLst>
+                          </p:cTn>
+                        </p:par>
+                      </p:childTnLst>
+                    </p:cTn>
+                  </p:par>
+                </p:childTnLst>
+              </p:cTn>
+              <p:prevCondLst>
+                <p:cond evt="onPrev" delay="0">
+                  <p:tgtEl>
+                    <p:sldTgt/>
+                  </p:tgtEl>
+                </p:cond>
+              </p:prevCondLst>
+              <p:nextCondLst>
+                <p:cond evt="onNext" delay="0">
+                  <p:tgtEl>
+                    <p:sldTgt/>
+                  </p:tgtEl>
+                </p:cond>
+              </p:nextCondLst>
+            </p:seq>
+          </p:childTnLst>
+        </p:cTn>
+      </p:par>
+    </p:tnLst>
+    <p:bldLst>
+      <p:bldP spid="2" grpId="0"/>
+      <p:bldP spid="3" grpId="0" build="p"/>
+    </p:bldLst>
+  </p:timing>
+</p:sld>
+</file>
+
+<file path=ppt/slides/slide11.xml><?xml version="1.0" encoding="utf-8"?>
+<p:sld xmlns:a="http://schemas.openxmlformats.org/drawingml/2006/main" xmlns:r="http://schemas.openxmlformats.org/officeDocument/2006/relationships" xmlns:p="http://schemas.openxmlformats.org/presentationml/2006/main">
+  <p:cSld>
+    <p:spTree>
+      <p:nvGrpSpPr>
         <p:cNvPr id="1" name=""/>
         <p:cNvGrpSpPr/>
         <p:nvPr/>
@@ -19943,7 +20620,7 @@
 </p:sld>
 </file>
 
-<file path=ppt/slides/slide11.xml><?xml version="1.0" encoding="utf-8"?>
+<file path=ppt/slides/slide12.xml><?xml version="1.0" encoding="utf-8"?>
 <p:sld xmlns:a="http://schemas.openxmlformats.org/drawingml/2006/main" xmlns:r="http://schemas.openxmlformats.org/officeDocument/2006/relationships" xmlns:p="http://schemas.openxmlformats.org/presentationml/2006/main">
   <p:cSld>
     <p:spTree>
@@ -20073,7 +20750,7 @@
 </p:sld>
 </file>
 
-<file path=ppt/slides/slide12.xml><?xml version="1.0" encoding="utf-8"?>
+<file path=ppt/slides/slide13.xml><?xml version="1.0" encoding="utf-8"?>
 <p:sld xmlns:a="http://schemas.openxmlformats.org/drawingml/2006/main" xmlns:r="http://schemas.openxmlformats.org/officeDocument/2006/relationships" xmlns:p="http://schemas.openxmlformats.org/presentationml/2006/main">
   <p:cSld>
     <p:spTree>
@@ -22096,6 +22773,110 @@
           <a:lstStyle/>
           <a:p>
             <a:r>
+              <a:t>Evaluation</a:t>
+            </a:r>
+          </a:p>
+        </p:txBody>
+      </p:sp>
+      <p:sp>
+        <p:nvSpPr>
+          <p:cNvPr id="3" name="Content Placeholder 2"/>
+          <p:cNvSpPr>
+            <a:spLocks noGrp="1"/>
+          </p:cNvSpPr>
+          <p:nvPr>
+            <p:ph idx="1"/>
+          </p:nvPr>
+        </p:nvSpPr>
+        <p:spPr/>
+        <p:txBody>
+          <a:bodyPr/>
+          <a:lstStyle/>
+          <a:p>
+            <a:r>
+              <a:rPr dirty="0"/>
+              <a:t>Method: 5 test queries, manual relevance scores (0-2 scale)</a:t>
+            </a:r>
+          </a:p>
+          <a:p>
+            <a:r>
+              <a:rPr dirty="0"/>
+              <a:t>Metrics Used: Precision@5, MAP, NDCG@5</a:t>
+            </a:r>
+          </a:p>
+          <a:p>
+            <a:r>
+              <a:rPr dirty="0"/>
+              <a:t>Results: Precision@5 = 1.0 (4/5 cases), MAP = 1.0, NDCG@5 = 0.80 - 1.00</a:t>
+            </a:r>
+            <a:endParaRPr lang="de-DE" dirty="0"/>
+          </a:p>
+          <a:p>
+            <a:r>
+              <a:rPr lang="de-DE" dirty="0"/>
+              <a:t>Other </a:t>
+            </a:r>
+            <a:r>
+              <a:rPr lang="de-DE" dirty="0" err="1"/>
+              <a:t>possibilities</a:t>
+            </a:r>
+            <a:r>
+              <a:rPr lang="de-DE" dirty="0"/>
+              <a:t> </a:t>
+            </a:r>
+            <a:r>
+              <a:rPr lang="de-DE" dirty="0" err="1"/>
+              <a:t>of</a:t>
+            </a:r>
+            <a:r>
+              <a:rPr lang="de-DE" dirty="0"/>
+              <a:t> Evaluation: User Surveys</a:t>
+            </a:r>
+            <a:endParaRPr dirty="0"/>
+          </a:p>
+        </p:txBody>
+      </p:sp>
+    </p:spTree>
+  </p:cSld>
+  <p:clrMapOvr>
+    <a:masterClrMapping/>
+  </p:clrMapOvr>
+</p:sld>
+</file>
+
+<file path=ppt/slides/slide9.xml><?xml version="1.0" encoding="utf-8"?>
+<p:sld xmlns:a="http://schemas.openxmlformats.org/drawingml/2006/main" xmlns:r="http://schemas.openxmlformats.org/officeDocument/2006/relationships" xmlns:p="http://schemas.openxmlformats.org/presentationml/2006/main">
+  <p:cSld>
+    <p:spTree>
+      <p:nvGrpSpPr>
+        <p:cNvPr id="1" name=""/>
+        <p:cNvGrpSpPr/>
+        <p:nvPr/>
+      </p:nvGrpSpPr>
+      <p:grpSpPr>
+        <a:xfrm>
+          <a:off x="0" y="0"/>
+          <a:ext cx="0" cy="0"/>
+          <a:chOff x="0" y="0"/>
+          <a:chExt cx="0" cy="0"/>
+        </a:xfrm>
+      </p:grpSpPr>
+      <p:sp>
+        <p:nvSpPr>
+          <p:cNvPr id="2" name="Title 1"/>
+          <p:cNvSpPr>
+            <a:spLocks noGrp="1"/>
+          </p:cNvSpPr>
+          <p:nvPr>
+            <p:ph type="title"/>
+          </p:nvPr>
+        </p:nvSpPr>
+        <p:spPr/>
+        <p:txBody>
+          <a:bodyPr/>
+          <a:lstStyle/>
+          <a:p>
+            <a:r>
               <a:rPr lang="de-DE" dirty="0"/>
               <a:t>Demo</a:t>
             </a:r>
@@ -22166,682 +22947,6 @@
   <p:clrMapOvr>
     <a:masterClrMapping/>
   </p:clrMapOvr>
-</p:sld>
-</file>
-
-<file path=ppt/slides/slide9.xml><?xml version="1.0" encoding="utf-8"?>
-<p:sld xmlns:a="http://schemas.openxmlformats.org/drawingml/2006/main" xmlns:r="http://schemas.openxmlformats.org/officeDocument/2006/relationships" xmlns:p="http://schemas.openxmlformats.org/presentationml/2006/main">
-  <p:cSld>
-    <p:spTree>
-      <p:nvGrpSpPr>
-        <p:cNvPr id="1" name="">
-          <a:extLst>
-            <a:ext uri="{FF2B5EF4-FFF2-40B4-BE49-F238E27FC236}">
-              <a16:creationId xmlns:a16="http://schemas.microsoft.com/office/drawing/2014/main" id="{EFDD33E0-45E1-C3D3-0DA7-F1349EEB6903}"/>
-            </a:ext>
-          </a:extLst>
-        </p:cNvPr>
-        <p:cNvGrpSpPr/>
-        <p:nvPr/>
-      </p:nvGrpSpPr>
-      <p:grpSpPr>
-        <a:xfrm>
-          <a:off x="0" y="0"/>
-          <a:ext cx="0" cy="0"/>
-          <a:chOff x="0" y="0"/>
-          <a:chExt cx="0" cy="0"/>
-        </a:xfrm>
-      </p:grpSpPr>
-      <p:sp>
-        <p:nvSpPr>
-          <p:cNvPr id="2" name="Titel 1">
-            <a:extLst>
-              <a:ext uri="{FF2B5EF4-FFF2-40B4-BE49-F238E27FC236}">
-                <a16:creationId xmlns:a16="http://schemas.microsoft.com/office/drawing/2014/main" id="{AD237D43-D834-5F9E-0EAB-E0D76B636679}"/>
-              </a:ext>
-            </a:extLst>
-          </p:cNvPr>
-          <p:cNvSpPr>
-            <a:spLocks noGrp="1"/>
-          </p:cNvSpPr>
-          <p:nvPr>
-            <p:ph type="title"/>
-          </p:nvPr>
-        </p:nvSpPr>
-        <p:spPr/>
-        <p:txBody>
-          <a:bodyPr/>
-          <a:lstStyle/>
-          <a:p>
-            <a:r>
-              <a:rPr lang="de-DE" dirty="0"/>
-              <a:t>Teamwork &amp; Task Distribution</a:t>
-            </a:r>
-          </a:p>
-        </p:txBody>
-      </p:sp>
-      <p:sp>
-        <p:nvSpPr>
-          <p:cNvPr id="3" name="Inhaltsplatzhalter 2">
-            <a:extLst>
-              <a:ext uri="{FF2B5EF4-FFF2-40B4-BE49-F238E27FC236}">
-                <a16:creationId xmlns:a16="http://schemas.microsoft.com/office/drawing/2014/main" id="{9E430164-D344-9636-DEE0-9D0050066D86}"/>
-              </a:ext>
-            </a:extLst>
-          </p:cNvPr>
-          <p:cNvSpPr>
-            <a:spLocks noGrp="1"/>
-          </p:cNvSpPr>
-          <p:nvPr>
-            <p:ph idx="1"/>
-          </p:nvPr>
-        </p:nvSpPr>
-        <p:spPr/>
-        <p:txBody>
-          <a:bodyPr>
-            <a:normAutofit fontScale="92500" lnSpcReduction="10000"/>
-          </a:bodyPr>
-          <a:lstStyle/>
-          <a:p>
-            <a:r>
-              <a:rPr lang="en-US" dirty="0"/>
-              <a:t>Tasks chosen based on personal interests</a:t>
-            </a:r>
-          </a:p>
-          <a:p>
-            <a:r>
-              <a:rPr lang="en-US" dirty="0"/>
-              <a:t>Workload balanced across the team</a:t>
-            </a:r>
-          </a:p>
-          <a:p>
-            <a:r>
-              <a:rPr lang="de-DE" dirty="0" err="1"/>
-              <a:t>Everyone</a:t>
-            </a:r>
-            <a:r>
-              <a:rPr lang="de-DE" dirty="0"/>
-              <a:t> </a:t>
-            </a:r>
-            <a:r>
-              <a:rPr lang="de-DE" dirty="0" err="1"/>
-              <a:t>contributed</a:t>
-            </a:r>
-            <a:r>
-              <a:rPr lang="de-DE" dirty="0"/>
-              <a:t> </a:t>
-            </a:r>
-            <a:r>
-              <a:rPr lang="de-DE" dirty="0" err="1"/>
-              <a:t>equally</a:t>
-            </a:r>
-            <a:endParaRPr lang="en-US" dirty="0"/>
-          </a:p>
-          <a:p>
-            <a:r>
-              <a:rPr lang="en-US" dirty="0"/>
-              <a:t>Dilara: Data Retrieval and Initial Code Testing with Python, Information Retrieval, </a:t>
-            </a:r>
-            <a:r>
-              <a:rPr lang="en-US" dirty="0" err="1"/>
-              <a:t>Powerpoint</a:t>
-            </a:r>
-            <a:r>
-              <a:rPr lang="en-US" dirty="0"/>
-              <a:t>, Report</a:t>
-            </a:r>
-          </a:p>
-          <a:p>
-            <a:r>
-              <a:rPr lang="en-US" dirty="0"/>
-              <a:t>Elyesa: Neo4j-Character Analysis, Report, Presentation, Team Mentoring</a:t>
-            </a:r>
-          </a:p>
-          <a:p>
-            <a:r>
-              <a:rPr lang="en-US" dirty="0"/>
-              <a:t>Tim: Character-Analysis-Evaluation, Report, UI</a:t>
-            </a:r>
-          </a:p>
-          <a:p>
-            <a:r>
-              <a:rPr lang="en-US" dirty="0"/>
-              <a:t>Hamidreza: Neo4j-Migration and Neo4j-Shortes-Path, Information Retrieval, Report</a:t>
-            </a:r>
-            <a:br>
-              <a:rPr lang="en-US" dirty="0"/>
-            </a:br>
-            <a:endParaRPr lang="en-US" dirty="0"/>
-          </a:p>
-        </p:txBody>
-      </p:sp>
-    </p:spTree>
-    <p:extLst>
-      <p:ext uri="{BB962C8B-B14F-4D97-AF65-F5344CB8AC3E}">
-        <p14:creationId xmlns:p14="http://schemas.microsoft.com/office/powerpoint/2010/main" val="3070015078"/>
-      </p:ext>
-    </p:extLst>
-  </p:cSld>
-  <p:clrMapOvr>
-    <a:masterClrMapping/>
-  </p:clrMapOvr>
-  <p:timing>
-    <p:tnLst>
-      <p:par>
-        <p:cTn id="1" dur="indefinite" restart="never" nodeType="tmRoot">
-          <p:childTnLst>
-            <p:seq concurrent="1" nextAc="seek">
-              <p:cTn id="2" dur="indefinite" nodeType="mainSeq">
-                <p:childTnLst>
-                  <p:par>
-                    <p:cTn id="3" fill="hold">
-                      <p:stCondLst>
-                        <p:cond delay="indefinite"/>
-                        <p:cond evt="onBegin" delay="0">
-                          <p:tn val="2"/>
-                        </p:cond>
-                      </p:stCondLst>
-                      <p:childTnLst>
-                        <p:par>
-                          <p:cTn id="4" fill="hold">
-                            <p:stCondLst>
-                              <p:cond delay="0"/>
-                            </p:stCondLst>
-                            <p:childTnLst>
-                              <p:par>
-                                <p:cTn id="5" presetID="10" presetClass="entr" presetSubtype="0" fill="hold" grpId="0" nodeType="withEffect">
-                                  <p:stCondLst>
-                                    <p:cond delay="0"/>
-                                  </p:stCondLst>
-                                  <p:childTnLst>
-                                    <p:set>
-                                      <p:cBhvr>
-                                        <p:cTn id="6" dur="1" fill="hold">
-                                          <p:stCondLst>
-                                            <p:cond delay="0"/>
-                                          </p:stCondLst>
-                                        </p:cTn>
-                                        <p:tgtEl>
-                                          <p:spTgt spid="2"/>
-                                        </p:tgtEl>
-                                        <p:attrNameLst>
-                                          <p:attrName>style.visibility</p:attrName>
-                                        </p:attrNameLst>
-                                      </p:cBhvr>
-                                      <p:to>
-                                        <p:strVal val="visible"/>
-                                      </p:to>
-                                    </p:set>
-                                    <p:animEffect transition="in" filter="fade">
-                                      <p:cBhvr>
-                                        <p:cTn id="7" dur="500"/>
-                                        <p:tgtEl>
-                                          <p:spTgt spid="2"/>
-                                        </p:tgtEl>
-                                      </p:cBhvr>
-                                    </p:animEffect>
-                                  </p:childTnLst>
-                                </p:cTn>
-                              </p:par>
-                            </p:childTnLst>
-                          </p:cTn>
-                        </p:par>
-                      </p:childTnLst>
-                    </p:cTn>
-                  </p:par>
-                  <p:par>
-                    <p:cTn id="8" fill="hold">
-                      <p:stCondLst>
-                        <p:cond delay="indefinite"/>
-                      </p:stCondLst>
-                      <p:childTnLst>
-                        <p:par>
-                          <p:cTn id="9" fill="hold">
-                            <p:stCondLst>
-                              <p:cond delay="0"/>
-                            </p:stCondLst>
-                            <p:childTnLst>
-                              <p:par>
-                                <p:cTn id="10" presetID="10" presetClass="entr" presetSubtype="0" fill="hold" grpId="0" nodeType="clickEffect">
-                                  <p:stCondLst>
-                                    <p:cond delay="0"/>
-                                  </p:stCondLst>
-                                  <p:childTnLst>
-                                    <p:set>
-                                      <p:cBhvr>
-                                        <p:cTn id="11" dur="1" fill="hold">
-                                          <p:stCondLst>
-                                            <p:cond delay="0"/>
-                                          </p:stCondLst>
-                                        </p:cTn>
-                                        <p:tgtEl>
-                                          <p:spTgt spid="3">
-                                            <p:txEl>
-                                              <p:pRg st="0" end="0"/>
-                                            </p:txEl>
-                                          </p:spTgt>
-                                        </p:tgtEl>
-                                        <p:attrNameLst>
-                                          <p:attrName>style.visibility</p:attrName>
-                                        </p:attrNameLst>
-                                      </p:cBhvr>
-                                      <p:to>
-                                        <p:strVal val="visible"/>
-                                      </p:to>
-                                    </p:set>
-                                    <p:animEffect transition="in" filter="fade">
-                                      <p:cBhvr>
-                                        <p:cTn id="12" dur="500"/>
-                                        <p:tgtEl>
-                                          <p:spTgt spid="3">
-                                            <p:txEl>
-                                              <p:pRg st="0" end="0"/>
-                                            </p:txEl>
-                                          </p:spTgt>
-                                        </p:tgtEl>
-                                      </p:cBhvr>
-                                    </p:animEffect>
-                                  </p:childTnLst>
-                                </p:cTn>
-                              </p:par>
-                            </p:childTnLst>
-                          </p:cTn>
-                        </p:par>
-                      </p:childTnLst>
-                    </p:cTn>
-                  </p:par>
-                  <p:par>
-                    <p:cTn id="13" fill="hold">
-                      <p:stCondLst>
-                        <p:cond delay="indefinite"/>
-                      </p:stCondLst>
-                      <p:childTnLst>
-                        <p:par>
-                          <p:cTn id="14" fill="hold">
-                            <p:stCondLst>
-                              <p:cond delay="0"/>
-                            </p:stCondLst>
-                            <p:childTnLst>
-                              <p:par>
-                                <p:cTn id="15" presetID="10" presetClass="entr" presetSubtype="0" fill="hold" grpId="0" nodeType="clickEffect">
-                                  <p:stCondLst>
-                                    <p:cond delay="0"/>
-                                  </p:stCondLst>
-                                  <p:childTnLst>
-                                    <p:set>
-                                      <p:cBhvr>
-                                        <p:cTn id="16" dur="1" fill="hold">
-                                          <p:stCondLst>
-                                            <p:cond delay="0"/>
-                                          </p:stCondLst>
-                                        </p:cTn>
-                                        <p:tgtEl>
-                                          <p:spTgt spid="3">
-                                            <p:txEl>
-                                              <p:pRg st="1" end="1"/>
-                                            </p:txEl>
-                                          </p:spTgt>
-                                        </p:tgtEl>
-                                        <p:attrNameLst>
-                                          <p:attrName>style.visibility</p:attrName>
-                                        </p:attrNameLst>
-                                      </p:cBhvr>
-                                      <p:to>
-                                        <p:strVal val="visible"/>
-                                      </p:to>
-                                    </p:set>
-                                    <p:animEffect transition="in" filter="fade">
-                                      <p:cBhvr>
-                                        <p:cTn id="17" dur="500"/>
-                                        <p:tgtEl>
-                                          <p:spTgt spid="3">
-                                            <p:txEl>
-                                              <p:pRg st="1" end="1"/>
-                                            </p:txEl>
-                                          </p:spTgt>
-                                        </p:tgtEl>
-                                      </p:cBhvr>
-                                    </p:animEffect>
-                                  </p:childTnLst>
-                                </p:cTn>
-                              </p:par>
-                            </p:childTnLst>
-                          </p:cTn>
-                        </p:par>
-                      </p:childTnLst>
-                    </p:cTn>
-                  </p:par>
-                  <p:par>
-                    <p:cTn id="18" fill="hold">
-                      <p:stCondLst>
-                        <p:cond delay="indefinite"/>
-                      </p:stCondLst>
-                      <p:childTnLst>
-                        <p:par>
-                          <p:cTn id="19" fill="hold">
-                            <p:stCondLst>
-                              <p:cond delay="0"/>
-                            </p:stCondLst>
-                            <p:childTnLst>
-                              <p:par>
-                                <p:cTn id="20" presetID="10" presetClass="entr" presetSubtype="0" fill="hold" grpId="0" nodeType="clickEffect">
-                                  <p:stCondLst>
-                                    <p:cond delay="0"/>
-                                  </p:stCondLst>
-                                  <p:childTnLst>
-                                    <p:set>
-                                      <p:cBhvr>
-                                        <p:cTn id="21" dur="1" fill="hold">
-                                          <p:stCondLst>
-                                            <p:cond delay="0"/>
-                                          </p:stCondLst>
-                                        </p:cTn>
-                                        <p:tgtEl>
-                                          <p:spTgt spid="3">
-                                            <p:txEl>
-                                              <p:pRg st="2" end="2"/>
-                                            </p:txEl>
-                                          </p:spTgt>
-                                        </p:tgtEl>
-                                        <p:attrNameLst>
-                                          <p:attrName>style.visibility</p:attrName>
-                                        </p:attrNameLst>
-                                      </p:cBhvr>
-                                      <p:to>
-                                        <p:strVal val="visible"/>
-                                      </p:to>
-                                    </p:set>
-                                    <p:animEffect transition="in" filter="fade">
-                                      <p:cBhvr>
-                                        <p:cTn id="22" dur="500"/>
-                                        <p:tgtEl>
-                                          <p:spTgt spid="3">
-                                            <p:txEl>
-                                              <p:pRg st="2" end="2"/>
-                                            </p:txEl>
-                                          </p:spTgt>
-                                        </p:tgtEl>
-                                      </p:cBhvr>
-                                    </p:animEffect>
-                                  </p:childTnLst>
-                                </p:cTn>
-                              </p:par>
-                            </p:childTnLst>
-                          </p:cTn>
-                        </p:par>
-                      </p:childTnLst>
-                    </p:cTn>
-                  </p:par>
-                  <p:par>
-                    <p:cTn id="23" fill="hold">
-                      <p:stCondLst>
-                        <p:cond delay="indefinite"/>
-                      </p:stCondLst>
-                      <p:childTnLst>
-                        <p:par>
-                          <p:cTn id="24" fill="hold">
-                            <p:stCondLst>
-                              <p:cond delay="0"/>
-                            </p:stCondLst>
-                            <p:childTnLst>
-                              <p:par>
-                                <p:cTn id="25" presetID="10" presetClass="entr" presetSubtype="0" fill="hold" grpId="0" nodeType="clickEffect">
-                                  <p:stCondLst>
-                                    <p:cond delay="0"/>
-                                  </p:stCondLst>
-                                  <p:childTnLst>
-                                    <p:set>
-                                      <p:cBhvr>
-                                        <p:cTn id="26" dur="1" fill="hold">
-                                          <p:stCondLst>
-                                            <p:cond delay="0"/>
-                                          </p:stCondLst>
-                                        </p:cTn>
-                                        <p:tgtEl>
-                                          <p:spTgt spid="3">
-                                            <p:txEl>
-                                              <p:pRg st="3" end="3"/>
-                                            </p:txEl>
-                                          </p:spTgt>
-                                        </p:tgtEl>
-                                        <p:attrNameLst>
-                                          <p:attrName>style.visibility</p:attrName>
-                                        </p:attrNameLst>
-                                      </p:cBhvr>
-                                      <p:to>
-                                        <p:strVal val="visible"/>
-                                      </p:to>
-                                    </p:set>
-                                    <p:animEffect transition="in" filter="fade">
-                                      <p:cBhvr>
-                                        <p:cTn id="27" dur="500"/>
-                                        <p:tgtEl>
-                                          <p:spTgt spid="3">
-                                            <p:txEl>
-                                              <p:pRg st="3" end="3"/>
-                                            </p:txEl>
-                                          </p:spTgt>
-                                        </p:tgtEl>
-                                      </p:cBhvr>
-                                    </p:animEffect>
-                                  </p:childTnLst>
-                                </p:cTn>
-                              </p:par>
-                            </p:childTnLst>
-                          </p:cTn>
-                        </p:par>
-                      </p:childTnLst>
-                    </p:cTn>
-                  </p:par>
-                  <p:par>
-                    <p:cTn id="28" fill="hold">
-                      <p:stCondLst>
-                        <p:cond delay="indefinite"/>
-                      </p:stCondLst>
-                      <p:childTnLst>
-                        <p:par>
-                          <p:cTn id="29" fill="hold">
-                            <p:stCondLst>
-                              <p:cond delay="0"/>
-                            </p:stCondLst>
-                            <p:childTnLst>
-                              <p:par>
-                                <p:cTn id="30" presetID="10" presetClass="entr" presetSubtype="0" fill="hold" grpId="0" nodeType="clickEffect">
-                                  <p:stCondLst>
-                                    <p:cond delay="0"/>
-                                  </p:stCondLst>
-                                  <p:childTnLst>
-                                    <p:set>
-                                      <p:cBhvr>
-                                        <p:cTn id="31" dur="1" fill="hold">
-                                          <p:stCondLst>
-                                            <p:cond delay="0"/>
-                                          </p:stCondLst>
-                                        </p:cTn>
-                                        <p:tgtEl>
-                                          <p:spTgt spid="3">
-                                            <p:txEl>
-                                              <p:pRg st="4" end="4"/>
-                                            </p:txEl>
-                                          </p:spTgt>
-                                        </p:tgtEl>
-                                        <p:attrNameLst>
-                                          <p:attrName>style.visibility</p:attrName>
-                                        </p:attrNameLst>
-                                      </p:cBhvr>
-                                      <p:to>
-                                        <p:strVal val="visible"/>
-                                      </p:to>
-                                    </p:set>
-                                    <p:animEffect transition="in" filter="fade">
-                                      <p:cBhvr>
-                                        <p:cTn id="32" dur="500"/>
-                                        <p:tgtEl>
-                                          <p:spTgt spid="3">
-                                            <p:txEl>
-                                              <p:pRg st="4" end="4"/>
-                                            </p:txEl>
-                                          </p:spTgt>
-                                        </p:tgtEl>
-                                      </p:cBhvr>
-                                    </p:animEffect>
-                                  </p:childTnLst>
-                                </p:cTn>
-                              </p:par>
-                            </p:childTnLst>
-                          </p:cTn>
-                        </p:par>
-                      </p:childTnLst>
-                    </p:cTn>
-                  </p:par>
-                  <p:par>
-                    <p:cTn id="33" fill="hold">
-                      <p:stCondLst>
-                        <p:cond delay="indefinite"/>
-                      </p:stCondLst>
-                      <p:childTnLst>
-                        <p:par>
-                          <p:cTn id="34" fill="hold">
-                            <p:stCondLst>
-                              <p:cond delay="0"/>
-                            </p:stCondLst>
-                            <p:childTnLst>
-                              <p:par>
-                                <p:cTn id="35" presetID="10" presetClass="entr" presetSubtype="0" fill="hold" grpId="0" nodeType="clickEffect">
-                                  <p:stCondLst>
-                                    <p:cond delay="0"/>
-                                  </p:stCondLst>
-                                  <p:childTnLst>
-                                    <p:set>
-                                      <p:cBhvr>
-                                        <p:cTn id="36" dur="1" fill="hold">
-                                          <p:stCondLst>
-                                            <p:cond delay="0"/>
-                                          </p:stCondLst>
-                                        </p:cTn>
-                                        <p:tgtEl>
-                                          <p:spTgt spid="3">
-                                            <p:txEl>
-                                              <p:pRg st="5" end="5"/>
-                                            </p:txEl>
-                                          </p:spTgt>
-                                        </p:tgtEl>
-                                        <p:attrNameLst>
-                                          <p:attrName>style.visibility</p:attrName>
-                                        </p:attrNameLst>
-                                      </p:cBhvr>
-                                      <p:to>
-                                        <p:strVal val="visible"/>
-                                      </p:to>
-                                    </p:set>
-                                    <p:animEffect transition="in" filter="fade">
-                                      <p:cBhvr>
-                                        <p:cTn id="37" dur="500"/>
-                                        <p:tgtEl>
-                                          <p:spTgt spid="3">
-                                            <p:txEl>
-                                              <p:pRg st="5" end="5"/>
-                                            </p:txEl>
-                                          </p:spTgt>
-                                        </p:tgtEl>
-                                      </p:cBhvr>
-                                    </p:animEffect>
-                                  </p:childTnLst>
-                                </p:cTn>
-                              </p:par>
-                            </p:childTnLst>
-                          </p:cTn>
-                        </p:par>
-                      </p:childTnLst>
-                    </p:cTn>
-                  </p:par>
-                  <p:par>
-                    <p:cTn id="38" fill="hold">
-                      <p:stCondLst>
-                        <p:cond delay="indefinite"/>
-                      </p:stCondLst>
-                      <p:childTnLst>
-                        <p:par>
-                          <p:cTn id="39" fill="hold">
-                            <p:stCondLst>
-                              <p:cond delay="0"/>
-                            </p:stCondLst>
-                            <p:childTnLst>
-                              <p:par>
-                                <p:cTn id="40" presetID="10" presetClass="entr" presetSubtype="0" fill="hold" grpId="0" nodeType="clickEffect">
-                                  <p:stCondLst>
-                                    <p:cond delay="0"/>
-                                  </p:stCondLst>
-                                  <p:childTnLst>
-                                    <p:set>
-                                      <p:cBhvr>
-                                        <p:cTn id="41" dur="1" fill="hold">
-                                          <p:stCondLst>
-                                            <p:cond delay="0"/>
-                                          </p:stCondLst>
-                                        </p:cTn>
-                                        <p:tgtEl>
-                                          <p:spTgt spid="3">
-                                            <p:txEl>
-                                              <p:pRg st="6" end="6"/>
-                                            </p:txEl>
-                                          </p:spTgt>
-                                        </p:tgtEl>
-                                        <p:attrNameLst>
-                                          <p:attrName>style.visibility</p:attrName>
-                                        </p:attrNameLst>
-                                      </p:cBhvr>
-                                      <p:to>
-                                        <p:strVal val="visible"/>
-                                      </p:to>
-                                    </p:set>
-                                    <p:animEffect transition="in" filter="fade">
-                                      <p:cBhvr>
-                                        <p:cTn id="42" dur="500"/>
-                                        <p:tgtEl>
-                                          <p:spTgt spid="3">
-                                            <p:txEl>
-                                              <p:pRg st="6" end="6"/>
-                                            </p:txEl>
-                                          </p:spTgt>
-                                        </p:tgtEl>
-                                      </p:cBhvr>
-                                    </p:animEffect>
-                                  </p:childTnLst>
-                                </p:cTn>
-                              </p:par>
-                            </p:childTnLst>
-                          </p:cTn>
-                        </p:par>
-                      </p:childTnLst>
-                    </p:cTn>
-                  </p:par>
-                </p:childTnLst>
-              </p:cTn>
-              <p:prevCondLst>
-                <p:cond evt="onPrev" delay="0">
-                  <p:tgtEl>
-                    <p:sldTgt/>
-                  </p:tgtEl>
-                </p:cond>
-              </p:prevCondLst>
-              <p:nextCondLst>
-                <p:cond evt="onNext" delay="0">
-                  <p:tgtEl>
-                    <p:sldTgt/>
-                  </p:tgtEl>
-                </p:cond>
-              </p:nextCondLst>
-            </p:seq>
-          </p:childTnLst>
-        </p:cTn>
-      </p:par>
-    </p:tnLst>
-    <p:bldLst>
-      <p:bldP spid="2" grpId="0"/>
-      <p:bldP spid="3" grpId="0" build="p"/>
-    </p:bldLst>
-  </p:timing>
 </p:sld>
 </file>
 

</xml_diff>